<commit_message>
update metric for ep06
</commit_message>
<xml_diff>
--- a/episode6/media/slides-episode-06.pptx
+++ b/episode6/media/slides-episode-06.pptx
@@ -367,7 +367,7 @@
                   <c:v>15</c:v>
                 </c:pt>
                 <c:pt idx="1">
-                  <c:v>0</c:v>
+                  <c:v>2</c:v>
                 </c:pt>
               </c:numCache>
             </c:numRef>
@@ -478,7 +478,62 @@
     </mc:Fallback>
   </mc:AlternateContent>
   <c:chart>
-    <c:autoTitleDeleted val="1"/>
+    <c:title>
+      <c:tx>
+        <c:rich>
+          <a:bodyPr rot="0" spcFirstLastPara="1" vertOverflow="ellipsis" vert="horz" wrap="square" anchor="ctr" anchorCtr="1"/>
+          <a:lstStyle/>
+          <a:p>
+            <a:pPr>
+              <a:defRPr sz="1800" b="1" i="0" u="none" strike="noStrike" kern="1200" baseline="0">
+                <a:solidFill>
+                  <a:schemeClr val="dk1">
+                    <a:lumMod val="75000"/>
+                    <a:lumOff val="25000"/>
+                  </a:schemeClr>
+                </a:solidFill>
+                <a:latin typeface="+mn-lt"/>
+                <a:ea typeface="+mn-ea"/>
+                <a:cs typeface="+mn-cs"/>
+              </a:defRPr>
+            </a:pPr>
+            <a:r>
+              <a:rPr lang="en-US"/>
+              <a:t>metrics per episode</a:t>
+            </a:r>
+          </a:p>
+        </c:rich>
+      </c:tx>
+      <c:overlay val="0"/>
+      <c:spPr>
+        <a:noFill/>
+        <a:ln>
+          <a:noFill/>
+        </a:ln>
+        <a:effectLst/>
+      </c:spPr>
+      <c:txPr>
+        <a:bodyPr rot="0" spcFirstLastPara="1" vertOverflow="ellipsis" vert="horz" wrap="square" anchor="ctr" anchorCtr="1"/>
+        <a:lstStyle/>
+        <a:p>
+          <a:pPr>
+            <a:defRPr sz="1800" b="1" i="0" u="none" strike="noStrike" kern="1200" baseline="0">
+              <a:solidFill>
+                <a:schemeClr val="dk1">
+                  <a:lumMod val="75000"/>
+                  <a:lumOff val="25000"/>
+                </a:schemeClr>
+              </a:solidFill>
+              <a:latin typeface="+mn-lt"/>
+              <a:ea typeface="+mn-ea"/>
+              <a:cs typeface="+mn-cs"/>
+            </a:defRPr>
+          </a:pPr>
+          <a:endParaRPr lang="LID4096"/>
+        </a:p>
+      </c:txPr>
+    </c:title>
+    <c:autoTitleDeleted val="0"/>
     <c:plotArea>
       <c:layout/>
       <c:barChart>
@@ -572,10 +627,10 @@
           </c:dLbls>
           <c:val>
             <c:numRef>
-              <c:f>Data!$B$2:$B$5</c:f>
+              <c:f>Data!$B$2:$B$6</c:f>
               <c:numCache>
                 <c:formatCode>General</c:formatCode>
-                <c:ptCount val="4"/>
+                <c:ptCount val="5"/>
                 <c:pt idx="0">
                   <c:v>1</c:v>
                 </c:pt>
@@ -588,12 +643,15 @@
                 <c:pt idx="3">
                   <c:v>4</c:v>
                 </c:pt>
+                <c:pt idx="4">
+                  <c:v>2</c:v>
+                </c:pt>
               </c:numCache>
             </c:numRef>
           </c:val>
           <c:extLst>
             <c:ext xmlns:c16="http://schemas.microsoft.com/office/drawing/2014/chart" uri="{C3380CC4-5D6E-409C-BE32-E72D297353CC}">
-              <c16:uniqueId val="{00000000-2C26-4FB6-9DD4-4A1E47D866B0}"/>
+              <c16:uniqueId val="{00000000-7513-48CE-B527-6C28D2D50E3C}"/>
             </c:ext>
           </c:extLst>
         </c:ser>
@@ -684,10 +742,10 @@
           </c:dLbls>
           <c:val>
             <c:numRef>
-              <c:f>Data!$C$2:$C$5</c:f>
+              <c:f>Data!$C$2:$C$6</c:f>
               <c:numCache>
                 <c:formatCode>General</c:formatCode>
-                <c:ptCount val="4"/>
+                <c:ptCount val="5"/>
                 <c:pt idx="0">
                   <c:v>24</c:v>
                 </c:pt>
@@ -700,12 +758,15 @@
                 <c:pt idx="3">
                   <c:v>16</c:v>
                 </c:pt>
+                <c:pt idx="4">
+                  <c:v>14</c:v>
+                </c:pt>
               </c:numCache>
             </c:numRef>
           </c:val>
           <c:extLst>
             <c:ext xmlns:c16="http://schemas.microsoft.com/office/drawing/2014/chart" uri="{C3380CC4-5D6E-409C-BE32-E72D297353CC}">
-              <c16:uniqueId val="{00000001-2C26-4FB6-9DD4-4A1E47D866B0}"/>
+              <c16:uniqueId val="{00000001-7513-48CE-B527-6C28D2D50E3C}"/>
             </c:ext>
           </c:extLst>
         </c:ser>
@@ -796,10 +857,10 @@
           </c:dLbls>
           <c:val>
             <c:numRef>
-              <c:f>Data!$D$2:$D$5</c:f>
+              <c:f>Data!$D$2:$D$6</c:f>
               <c:numCache>
                 <c:formatCode>General</c:formatCode>
-                <c:ptCount val="4"/>
+                <c:ptCount val="5"/>
                 <c:pt idx="0">
                   <c:v>0</c:v>
                 </c:pt>
@@ -812,12 +873,15 @@
                 <c:pt idx="3">
                   <c:v>0</c:v>
                 </c:pt>
+                <c:pt idx="4">
+                  <c:v>0</c:v>
+                </c:pt>
               </c:numCache>
             </c:numRef>
           </c:val>
           <c:extLst>
             <c:ext xmlns:c16="http://schemas.microsoft.com/office/drawing/2014/chart" uri="{C3380CC4-5D6E-409C-BE32-E72D297353CC}">
-              <c16:uniqueId val="{00000002-2C26-4FB6-9DD4-4A1E47D866B0}"/>
+              <c16:uniqueId val="{00000002-7513-48CE-B527-6C28D2D50E3C}"/>
             </c:ext>
           </c:extLst>
         </c:ser>
@@ -908,10 +972,10 @@
           </c:dLbls>
           <c:val>
             <c:numRef>
-              <c:f>Data!$E$2:$E$5</c:f>
+              <c:f>Data!$E$2:$E$6</c:f>
               <c:numCache>
                 <c:formatCode>General</c:formatCode>
-                <c:ptCount val="4"/>
+                <c:ptCount val="5"/>
                 <c:pt idx="0">
                   <c:v>0</c:v>
                 </c:pt>
@@ -924,12 +988,15 @@
                 <c:pt idx="3">
                   <c:v>0</c:v>
                 </c:pt>
+                <c:pt idx="4">
+                  <c:v>0</c:v>
+                </c:pt>
               </c:numCache>
             </c:numRef>
           </c:val>
           <c:extLst>
             <c:ext xmlns:c16="http://schemas.microsoft.com/office/drawing/2014/chart" uri="{C3380CC4-5D6E-409C-BE32-E72D297353CC}">
-              <c16:uniqueId val="{00000003-2C26-4FB6-9DD4-4A1E47D866B0}"/>
+              <c16:uniqueId val="{00000003-7513-48CE-B527-6C28D2D50E3C}"/>
             </c:ext>
           </c:extLst>
         </c:ser>
@@ -1020,10 +1087,10 @@
           </c:dLbls>
           <c:val>
             <c:numRef>
-              <c:f>Data!$F$2:$F$5</c:f>
+              <c:f>Data!$F$2:$F$6</c:f>
               <c:numCache>
                 <c:formatCode>General</c:formatCode>
-                <c:ptCount val="4"/>
+                <c:ptCount val="5"/>
                 <c:pt idx="0">
                   <c:v>3</c:v>
                 </c:pt>
@@ -1036,12 +1103,15 @@
                 <c:pt idx="3">
                   <c:v>2</c:v>
                 </c:pt>
+                <c:pt idx="4">
+                  <c:v>2</c:v>
+                </c:pt>
               </c:numCache>
             </c:numRef>
           </c:val>
           <c:extLst>
             <c:ext xmlns:c16="http://schemas.microsoft.com/office/drawing/2014/chart" uri="{C3380CC4-5D6E-409C-BE32-E72D297353CC}">
-              <c16:uniqueId val="{00000004-2C26-4FB6-9DD4-4A1E47D866B0}"/>
+              <c16:uniqueId val="{00000004-7513-48CE-B527-6C28D2D50E3C}"/>
             </c:ext>
           </c:extLst>
         </c:ser>
@@ -1265,7 +1335,62 @@
     </mc:Fallback>
   </mc:AlternateContent>
   <c:chart>
-    <c:autoTitleDeleted val="1"/>
+    <c:title>
+      <c:tx>
+        <c:rich>
+          <a:bodyPr rot="0" spcFirstLastPara="1" vertOverflow="ellipsis" vert="horz" wrap="square" anchor="ctr" anchorCtr="1"/>
+          <a:lstStyle/>
+          <a:p>
+            <a:pPr>
+              <a:defRPr sz="1800" b="1" i="0" u="none" strike="noStrike" kern="1200" baseline="0">
+                <a:solidFill>
+                  <a:schemeClr val="dk1">
+                    <a:lumMod val="75000"/>
+                    <a:lumOff val="25000"/>
+                  </a:schemeClr>
+                </a:solidFill>
+                <a:latin typeface="+mn-lt"/>
+                <a:ea typeface="+mn-ea"/>
+                <a:cs typeface="+mn-cs"/>
+              </a:defRPr>
+            </a:pPr>
+            <a:r>
+              <a:rPr lang="en-US"/>
+              <a:t>Viewers over time</a:t>
+            </a:r>
+          </a:p>
+        </c:rich>
+      </c:tx>
+      <c:overlay val="0"/>
+      <c:spPr>
+        <a:noFill/>
+        <a:ln>
+          <a:noFill/>
+        </a:ln>
+        <a:effectLst/>
+      </c:spPr>
+      <c:txPr>
+        <a:bodyPr rot="0" spcFirstLastPara="1" vertOverflow="ellipsis" vert="horz" wrap="square" anchor="ctr" anchorCtr="1"/>
+        <a:lstStyle/>
+        <a:p>
+          <a:pPr>
+            <a:defRPr sz="1800" b="1" i="0" u="none" strike="noStrike" kern="1200" baseline="0">
+              <a:solidFill>
+                <a:schemeClr val="dk1">
+                  <a:lumMod val="75000"/>
+                  <a:lumOff val="25000"/>
+                </a:schemeClr>
+              </a:solidFill>
+              <a:latin typeface="+mn-lt"/>
+              <a:ea typeface="+mn-ea"/>
+              <a:cs typeface="+mn-cs"/>
+            </a:defRPr>
+          </a:pPr>
+          <a:endParaRPr lang="LID4096"/>
+        </a:p>
+      </c:txPr>
+    </c:title>
+    <c:autoTitleDeleted val="0"/>
     <c:plotArea>
       <c:layout/>
       <c:lineChart>
@@ -1363,9 +1488,9 @@
           </c:dLbls>
           <c:cat>
             <c:strRef>
-              <c:f>Data!$A$2:$A$5</c:f>
+              <c:f>Data!$A$2:$A$6</c:f>
               <c:strCache>
-                <c:ptCount val="4"/>
+                <c:ptCount val="5"/>
                 <c:pt idx="0">
                   <c:v>EP 01</c:v>
                 </c:pt>
@@ -1378,15 +1503,18 @@
                 <c:pt idx="3">
                   <c:v>EP04</c:v>
                 </c:pt>
+                <c:pt idx="4">
+                  <c:v>EP05</c:v>
+                </c:pt>
               </c:strCache>
             </c:strRef>
           </c:cat>
           <c:val>
             <c:numRef>
-              <c:f>Data!$B$2:$B$5</c:f>
+              <c:f>Data!$B$2:$B$6</c:f>
               <c:numCache>
                 <c:formatCode>General</c:formatCode>
-                <c:ptCount val="4"/>
+                <c:ptCount val="5"/>
                 <c:pt idx="0">
                   <c:v>1</c:v>
                 </c:pt>
@@ -1399,13 +1527,16 @@
                 <c:pt idx="3">
                   <c:v>4</c:v>
                 </c:pt>
+                <c:pt idx="4">
+                  <c:v>2</c:v>
+                </c:pt>
               </c:numCache>
             </c:numRef>
           </c:val>
           <c:smooth val="0"/>
           <c:extLst>
             <c:ext xmlns:c16="http://schemas.microsoft.com/office/drawing/2014/chart" uri="{C3380CC4-5D6E-409C-BE32-E72D297353CC}">
-              <c16:uniqueId val="{00000000-7F94-4C38-B950-8F1057DAE2A0}"/>
+              <c16:uniqueId val="{00000000-E9F3-4D65-ADCC-3E2809DC2E67}"/>
             </c:ext>
           </c:extLst>
         </c:ser>
@@ -1501,9 +1632,9 @@
           </c:dLbls>
           <c:cat>
             <c:strRef>
-              <c:f>Data!$A$2:$A$5</c:f>
+              <c:f>Data!$A$2:$A$6</c:f>
               <c:strCache>
-                <c:ptCount val="4"/>
+                <c:ptCount val="5"/>
                 <c:pt idx="0">
                   <c:v>EP 01</c:v>
                 </c:pt>
@@ -1516,15 +1647,18 @@
                 <c:pt idx="3">
                   <c:v>EP04</c:v>
                 </c:pt>
+                <c:pt idx="4">
+                  <c:v>EP05</c:v>
+                </c:pt>
               </c:strCache>
             </c:strRef>
           </c:cat>
           <c:val>
             <c:numRef>
-              <c:f>Data!$C$2:$C$5</c:f>
+              <c:f>Data!$C$2:$C$6</c:f>
               <c:numCache>
                 <c:formatCode>General</c:formatCode>
-                <c:ptCount val="4"/>
+                <c:ptCount val="5"/>
                 <c:pt idx="0">
                   <c:v>24</c:v>
                 </c:pt>
@@ -1537,13 +1671,16 @@
                 <c:pt idx="3">
                   <c:v>16</c:v>
                 </c:pt>
+                <c:pt idx="4">
+                  <c:v>14</c:v>
+                </c:pt>
               </c:numCache>
             </c:numRef>
           </c:val>
           <c:smooth val="0"/>
           <c:extLst>
             <c:ext xmlns:c16="http://schemas.microsoft.com/office/drawing/2014/chart" uri="{C3380CC4-5D6E-409C-BE32-E72D297353CC}">
-              <c16:uniqueId val="{00000001-7F94-4C38-B950-8F1057DAE2A0}"/>
+              <c16:uniqueId val="{00000001-E9F3-4D65-ADCC-3E2809DC2E67}"/>
             </c:ext>
           </c:extLst>
         </c:ser>
@@ -1769,7 +1906,64 @@
     </mc:Fallback>
   </mc:AlternateContent>
   <c:chart>
-    <c:autoTitleDeleted val="1"/>
+    <c:title>
+      <c:tx>
+        <c:rich>
+          <a:bodyPr rot="0" spcFirstLastPara="1" vertOverflow="ellipsis" vert="horz" wrap="square" anchor="ctr" anchorCtr="1"/>
+          <a:lstStyle/>
+          <a:p>
+            <a:pPr>
+              <a:defRPr b="0" i="0" u="none" strike="noStrike" kern="1200" baseline="0">
+                <a:solidFill>
+                  <a:schemeClr val="dk1">
+                    <a:lumMod val="65000"/>
+                    <a:lumOff val="35000"/>
+                  </a:schemeClr>
+                </a:solidFill>
+                <a:effectLst/>
+                <a:latin typeface="+mn-lt"/>
+                <a:ea typeface="+mn-ea"/>
+                <a:cs typeface="+mn-cs"/>
+              </a:defRPr>
+            </a:pPr>
+            <a:r>
+              <a:rPr lang="en-US"/>
+              <a:t>Total Views</a:t>
+            </a:r>
+          </a:p>
+        </c:rich>
+      </c:tx>
+      <c:overlay val="0"/>
+      <c:spPr>
+        <a:noFill/>
+        <a:ln>
+          <a:noFill/>
+        </a:ln>
+        <a:effectLst/>
+      </c:spPr>
+      <c:txPr>
+        <a:bodyPr rot="0" spcFirstLastPara="1" vertOverflow="ellipsis" vert="horz" wrap="square" anchor="ctr" anchorCtr="1"/>
+        <a:lstStyle/>
+        <a:p>
+          <a:pPr>
+            <a:defRPr b="0" i="0" u="none" strike="noStrike" kern="1200" baseline="0">
+              <a:solidFill>
+                <a:schemeClr val="dk1">
+                  <a:lumMod val="65000"/>
+                  <a:lumOff val="35000"/>
+                </a:schemeClr>
+              </a:solidFill>
+              <a:effectLst/>
+              <a:latin typeface="+mn-lt"/>
+              <a:ea typeface="+mn-ea"/>
+              <a:cs typeface="+mn-cs"/>
+            </a:defRPr>
+          </a:pPr>
+          <a:endParaRPr lang="LID4096"/>
+        </a:p>
+      </c:txPr>
+    </c:title>
+    <c:autoTitleDeleted val="0"/>
     <c:plotArea>
       <c:layout/>
       <c:barChart>
@@ -1861,10 +2055,10 @@
           </c:dLbls>
           <c:val>
             <c:numRef>
-              <c:f>Data!$G$2:$G$5</c:f>
+              <c:f>Data!$G$2:$G$6</c:f>
               <c:numCache>
                 <c:formatCode>General</c:formatCode>
-                <c:ptCount val="4"/>
+                <c:ptCount val="5"/>
                 <c:pt idx="0">
                   <c:v>33</c:v>
                 </c:pt>
@@ -1877,12 +2071,15 @@
                 <c:pt idx="3">
                   <c:v>114</c:v>
                 </c:pt>
+                <c:pt idx="4">
+                  <c:v>128</c:v>
+                </c:pt>
               </c:numCache>
             </c:numRef>
           </c:val>
           <c:extLst>
             <c:ext xmlns:c16="http://schemas.microsoft.com/office/drawing/2014/chart" uri="{C3380CC4-5D6E-409C-BE32-E72D297353CC}">
-              <c16:uniqueId val="{00000000-4803-498E-8F6F-14C5282B42E7}"/>
+              <c16:uniqueId val="{00000000-C8AA-43F8-9FAA-CDAF8CB6B54F}"/>
             </c:ext>
           </c:extLst>
         </c:ser>
@@ -12748,14 +12945,14 @@
             <a:pPr lvl="1"/>
             <a:r>
               <a:rPr lang="en-US" sz="2800" dirty="0"/>
-              <a:t>Twitch: 15 (+4)</a:t>
+              <a:t>Twitch: 12 (-3)</a:t>
             </a:r>
           </a:p>
           <a:p>
             <a:pPr lvl="1"/>
             <a:r>
               <a:rPr lang="en-US" sz="2800" dirty="0"/>
-              <a:t>YouTube: 1 (+1)</a:t>
+              <a:t>YouTube: 2 (+1)</a:t>
             </a:r>
           </a:p>
           <a:p>
@@ -12791,7 +12988,7 @@
             <p:ph sz="half" idx="2"/>
             <p:extLst>
               <p:ext uri="{D42A27DB-BD31-4B8C-83A1-F6EECF244321}">
-                <p14:modId xmlns:p14="http://schemas.microsoft.com/office/powerpoint/2010/main" val="2118756447"/>
+                <p14:modId xmlns:p14="http://schemas.microsoft.com/office/powerpoint/2010/main" val="1986480229"/>
               </p:ext>
             </p:extLst>
           </p:nvPr>
@@ -13196,7 +13393,7 @@
       </p:sp>
       <p:graphicFrame>
         <p:nvGraphicFramePr>
-          <p:cNvPr id="10" name="Content Placeholder 9">
+          <p:cNvPr id="9" name="Content Placeholder 8">
             <a:extLst>
               <a:ext uri="{FF2B5EF4-FFF2-40B4-BE49-F238E27FC236}">
                 <a16:creationId xmlns:a16="http://schemas.microsoft.com/office/drawing/2014/main" id="{BBE7A64A-D636-4092-A1D9-51738E950101}"/>
@@ -13208,11 +13405,6 @@
           </p:cNvGraphicFramePr>
           <p:nvPr>
             <p:ph idx="1"/>
-            <p:extLst>
-              <p:ext uri="{D42A27DB-BD31-4B8C-83A1-F6EECF244321}">
-                <p14:modId xmlns:p14="http://schemas.microsoft.com/office/powerpoint/2010/main" val="3006467057"/>
-              </p:ext>
-            </p:extLst>
           </p:nvPr>
         </p:nvGraphicFramePr>
         <p:xfrm>
@@ -13440,7 +13632,7 @@
       </p:sp>
       <p:graphicFrame>
         <p:nvGraphicFramePr>
-          <p:cNvPr id="9" name="Content Placeholder 8">
+          <p:cNvPr id="12" name="Content Placeholder 11">
             <a:extLst>
               <a:ext uri="{FF2B5EF4-FFF2-40B4-BE49-F238E27FC236}">
                 <a16:creationId xmlns:a16="http://schemas.microsoft.com/office/drawing/2014/main" id="{4D382D66-024A-4373-BCC5-C8DAF2C771CA}"/>
@@ -13452,11 +13644,6 @@
           </p:cNvGraphicFramePr>
           <p:nvPr>
             <p:ph idx="1"/>
-            <p:extLst>
-              <p:ext uri="{D42A27DB-BD31-4B8C-83A1-F6EECF244321}">
-                <p14:modId xmlns:p14="http://schemas.microsoft.com/office/powerpoint/2010/main" val="2907815700"/>
-              </p:ext>
-            </p:extLst>
           </p:nvPr>
         </p:nvGraphicFramePr>
         <p:xfrm>
@@ -13684,7 +13871,7 @@
       </p:sp>
       <p:graphicFrame>
         <p:nvGraphicFramePr>
-          <p:cNvPr id="10" name="Content Placeholder 9">
+          <p:cNvPr id="11" name="Content Placeholder 10">
             <a:extLst>
               <a:ext uri="{FF2B5EF4-FFF2-40B4-BE49-F238E27FC236}">
                 <a16:creationId xmlns:a16="http://schemas.microsoft.com/office/drawing/2014/main" id="{2D639848-0BAF-4883-B3C1-3DC690B98E4F}"/>
@@ -13696,11 +13883,6 @@
           </p:cNvGraphicFramePr>
           <p:nvPr>
             <p:ph idx="1"/>
-            <p:extLst>
-              <p:ext uri="{D42A27DB-BD31-4B8C-83A1-F6EECF244321}">
-                <p14:modId xmlns:p14="http://schemas.microsoft.com/office/powerpoint/2010/main" val="615634970"/>
-              </p:ext>
-            </p:extLst>
           </p:nvPr>
         </p:nvGraphicFramePr>
         <p:xfrm>

</xml_diff>